<commit_message>
presentazione finita, alcune modifiche al codice
</commit_message>
<xml_diff>
--- a/PresentazioneFinale.pptx
+++ b/PresentazioneFinale.pptx
@@ -5,7 +5,7 @@
     <p:sldMasterId id="2147483739" r:id="rId1"/>
   </p:sldMasterIdLst>
   <p:notesMasterIdLst>
-    <p:notesMasterId r:id="rId9"/>
+    <p:notesMasterId r:id="rId10"/>
   </p:notesMasterIdLst>
   <p:sldIdLst>
     <p:sldId id="256" r:id="rId2"/>
@@ -15,6 +15,7 @@
     <p:sldId id="260" r:id="rId6"/>
     <p:sldId id="261" r:id="rId7"/>
     <p:sldId id="262" r:id="rId8"/>
+    <p:sldId id="263" r:id="rId9"/>
   </p:sldIdLst>
   <p:sldSz cx="12192000" cy="6858000"/>
   <p:notesSz cx="6858000" cy="9144000"/>
@@ -8235,7 +8236,7 @@
           <a:lstStyle/>
           <a:p>
             <a:pPr algn="ctr"/>
-            <a:endParaRPr lang="en-US"/>
+            <a:endParaRPr lang="en-US" dirty="0"/>
           </a:p>
         </p:txBody>
       </p:sp>
@@ -8423,7 +8424,7 @@
           <a:lstStyle/>
           <a:p>
             <a:pPr algn="ctr"/>
-            <a:endParaRPr lang="en-US"/>
+            <a:endParaRPr lang="en-US" dirty="0"/>
           </a:p>
         </p:txBody>
       </p:sp>
@@ -8876,7 +8877,7 @@
           <a:lstStyle/>
           <a:p>
             <a:pPr algn="ctr"/>
-            <a:endParaRPr lang="en-US"/>
+            <a:endParaRPr lang="en-US" dirty="0"/>
           </a:p>
         </p:txBody>
       </p:sp>
@@ -8956,7 +8957,7 @@
           <a:lstStyle/>
           <a:p>
             <a:pPr algn="ctr"/>
-            <a:endParaRPr lang="en-US"/>
+            <a:endParaRPr lang="en-US" dirty="0"/>
           </a:p>
         </p:txBody>
       </p:sp>
@@ -9221,7 +9222,7 @@
           <a:lstStyle/>
           <a:p>
             <a:pPr algn="ctr"/>
-            <a:endParaRPr lang="en-US"/>
+            <a:endParaRPr lang="en-US" dirty="0"/>
           </a:p>
         </p:txBody>
       </p:sp>
@@ -9250,7 +9251,7 @@
               <a:rPr lang="it-IT"/>
               <a:t>Realizzato in I.IS. Galileo Galilei Crema</a:t>
             </a:r>
-            <a:endParaRPr lang="en-US"/>
+            <a:endParaRPr lang="en-US" dirty="0"/>
           </a:p>
         </p:txBody>
       </p:sp>
@@ -9279,7 +9280,7 @@
               <a:rPr lang="en-US" smtClean="0"/>
               <a:t>1</a:t>
             </a:fld>
-            <a:endParaRPr lang="en-US"/>
+            <a:endParaRPr lang="en-US" dirty="0"/>
           </a:p>
         </p:txBody>
       </p:sp>
@@ -9577,7 +9578,7 @@
             <a:lstStyle/>
             <a:p>
               <a:pPr algn="ctr"/>
-              <a:endParaRPr lang="en-US"/>
+              <a:endParaRPr lang="en-US" dirty="0"/>
             </a:p>
           </p:txBody>
         </p:sp>
@@ -9655,7 +9656,7 @@
             <a:lstStyle/>
             <a:p>
               <a:pPr algn="ctr"/>
-              <a:endParaRPr lang="en-US"/>
+              <a:endParaRPr lang="en-US" dirty="0"/>
             </a:p>
           </p:txBody>
         </p:sp>
@@ -9881,7 +9882,7 @@
           <a:lstStyle/>
           <a:p>
             <a:pPr algn="ctr"/>
-            <a:endParaRPr lang="en-US"/>
+            <a:endParaRPr lang="en-US" dirty="0"/>
           </a:p>
         </p:txBody>
       </p:sp>
@@ -9914,8 +9915,12 @@
           <a:lstStyle/>
           <a:p>
             <a:r>
-              <a:rPr lang="en-US" sz="4800"/>
-              <a:t>Dataset scelto</a:t>
+              <a:rPr lang="en-US" sz="4800" dirty="0"/>
+              <a:t>Dataset </a:t>
+            </a:r>
+            <a:r>
+              <a:rPr lang="en-US" sz="4800" dirty="0" err="1"/>
+              <a:t>scelto</a:t>
             </a:r>
             <a:endParaRPr lang="en-US" sz="4800" dirty="0"/>
           </a:p>
@@ -10345,7 +10350,7 @@
               <a:buNone/>
             </a:pPr>
             <a:r>
-              <a:rPr lang="en-US" dirty="0" err="1"/>
+              <a:rPr lang="it-IT" dirty="0"/>
               <a:t>Abbiamo</a:t>
             </a:r>
             <a:r>
@@ -10531,12 +10536,12 @@
               <a:t> «inutile», </a:t>
             </a:r>
             <a:r>
-              <a:rPr lang="en-US" i="1" dirty="0" err="1"/>
-              <a:t>customer_id</a:t>
+              <a:rPr lang="it-IT" i="1" dirty="0"/>
+              <a:t>customer</a:t>
             </a:r>
             <a:r>
               <a:rPr lang="en-US" i="1" dirty="0"/>
-              <a:t>.</a:t>
+              <a:t>_id.</a:t>
             </a:r>
             <a:endParaRPr lang="en-US" dirty="0"/>
           </a:p>
@@ -14854,6 +14859,205 @@
     <p:extLst>
       <p:ext uri="{BB962C8B-B14F-4D97-AF65-F5344CB8AC3E}">
         <p14:creationId xmlns:p14="http://schemas.microsoft.com/office/powerpoint/2010/main" val="1588474286"/>
+      </p:ext>
+    </p:extLst>
+  </p:cSld>
+  <p:clrMapOvr>
+    <a:masterClrMapping/>
+  </p:clrMapOvr>
+</p:sld>
+</file>
+
+<file path=ppt/slides/slide8.xml><?xml version="1.0" encoding="utf-8"?>
+<p:sld xmlns:a="http://schemas.openxmlformats.org/drawingml/2006/main" xmlns:r="http://schemas.openxmlformats.org/officeDocument/2006/relationships" xmlns:p="http://schemas.openxmlformats.org/presentationml/2006/main">
+  <p:cSld>
+    <p:spTree>
+      <p:nvGrpSpPr>
+        <p:cNvPr id="1" name=""/>
+        <p:cNvGrpSpPr/>
+        <p:nvPr/>
+      </p:nvGrpSpPr>
+      <p:grpSpPr>
+        <a:xfrm>
+          <a:off x="0" y="0"/>
+          <a:ext cx="0" cy="0"/>
+          <a:chOff x="0" y="0"/>
+          <a:chExt cx="0" cy="0"/>
+        </a:xfrm>
+      </p:grpSpPr>
+      <p:sp>
+        <p:nvSpPr>
+          <p:cNvPr id="2" name="Title 1">
+            <a:extLst>
+              <a:ext uri="{FF2B5EF4-FFF2-40B4-BE49-F238E27FC236}">
+                <a16:creationId xmlns:a16="http://schemas.microsoft.com/office/drawing/2014/main" id="{EF81821F-F348-D13C-6C67-CC9A031CE520}"/>
+              </a:ext>
+            </a:extLst>
+          </p:cNvPr>
+          <p:cNvSpPr>
+            <a:spLocks noGrp="1"/>
+          </p:cNvSpPr>
+          <p:nvPr>
+            <p:ph type="title"/>
+          </p:nvPr>
+        </p:nvSpPr>
+        <p:spPr/>
+        <p:txBody>
+          <a:bodyPr/>
+          <a:lstStyle/>
+          <a:p>
+            <a:r>
+              <a:rPr lang="it-IT" dirty="0"/>
+              <a:t>Conclusione</a:t>
+            </a:r>
+          </a:p>
+        </p:txBody>
+      </p:sp>
+      <p:sp>
+        <p:nvSpPr>
+          <p:cNvPr id="3" name="Content Placeholder 2">
+            <a:extLst>
+              <a:ext uri="{FF2B5EF4-FFF2-40B4-BE49-F238E27FC236}">
+                <a16:creationId xmlns:a16="http://schemas.microsoft.com/office/drawing/2014/main" id="{580279C3-BC01-8367-B9DA-606FF2A1741A}"/>
+              </a:ext>
+            </a:extLst>
+          </p:cNvPr>
+          <p:cNvSpPr>
+            <a:spLocks noGrp="1"/>
+          </p:cNvSpPr>
+          <p:nvPr>
+            <p:ph idx="1"/>
+          </p:nvPr>
+        </p:nvSpPr>
+        <p:spPr>
+          <a:xfrm>
+            <a:off x="550863" y="2113199"/>
+            <a:ext cx="11090274" cy="1535257"/>
+          </a:xfrm>
+        </p:spPr>
+        <p:txBody>
+          <a:bodyPr anchor="ctr"/>
+          <a:lstStyle/>
+          <a:p>
+            <a:pPr marL="0" indent="0">
+              <a:buNone/>
+            </a:pPr>
+            <a:r>
+              <a:rPr lang="it-IT" dirty="0"/>
+              <a:t>Il codice è disponibile per la consultazione </a:t>
+            </a:r>
+            <a:r>
+              <a:rPr lang="it-IT" dirty="0">
+                <a:hlinkClick r:id="rId2"/>
+              </a:rPr>
+              <a:t>qui</a:t>
+            </a:r>
+            <a:r>
+              <a:rPr lang="it-IT" dirty="0"/>
+              <a:t>, inoltre sono presenti tutte le immagini che, date alcune scelte grafiche, sono in dimensione ridotta o leggermente ridimensionate.</a:t>
+            </a:r>
+          </a:p>
+        </p:txBody>
+      </p:sp>
+      <p:sp>
+        <p:nvSpPr>
+          <p:cNvPr id="4" name="Footer Placeholder 3">
+            <a:extLst>
+              <a:ext uri="{FF2B5EF4-FFF2-40B4-BE49-F238E27FC236}">
+                <a16:creationId xmlns:a16="http://schemas.microsoft.com/office/drawing/2014/main" id="{86EBEA9F-F28B-C9E0-326B-BD6D606014F9}"/>
+              </a:ext>
+            </a:extLst>
+          </p:cNvPr>
+          <p:cNvSpPr>
+            <a:spLocks noGrp="1"/>
+          </p:cNvSpPr>
+          <p:nvPr>
+            <p:ph type="ftr" sz="quarter" idx="11"/>
+          </p:nvPr>
+        </p:nvSpPr>
+        <p:spPr/>
+        <p:txBody>
+          <a:bodyPr/>
+          <a:lstStyle/>
+          <a:p>
+            <a:r>
+              <a:rPr lang="it-IT"/>
+              <a:t>Realizzato in I.IS. Galileo Galilei Crema</a:t>
+            </a:r>
+            <a:endParaRPr lang="en-US"/>
+          </a:p>
+        </p:txBody>
+      </p:sp>
+      <p:sp>
+        <p:nvSpPr>
+          <p:cNvPr id="5" name="Slide Number Placeholder 4">
+            <a:extLst>
+              <a:ext uri="{FF2B5EF4-FFF2-40B4-BE49-F238E27FC236}">
+                <a16:creationId xmlns:a16="http://schemas.microsoft.com/office/drawing/2014/main" id="{CC872A46-A0EE-D95A-E807-29DD495F9E76}"/>
+              </a:ext>
+            </a:extLst>
+          </p:cNvPr>
+          <p:cNvSpPr>
+            <a:spLocks noGrp="1"/>
+          </p:cNvSpPr>
+          <p:nvPr>
+            <p:ph type="sldNum" sz="quarter" idx="12"/>
+          </p:nvPr>
+        </p:nvSpPr>
+        <p:spPr/>
+        <p:txBody>
+          <a:bodyPr/>
+          <a:lstStyle/>
+          <a:p>
+            <a:fld id="{DBA1B0FB-D917-4C8C-928F-313BD683BF39}" type="slidenum">
+              <a:rPr lang="en-US" smtClean="0"/>
+              <a:t>8</a:t>
+            </a:fld>
+            <a:endParaRPr lang="en-US"/>
+          </a:p>
+        </p:txBody>
+      </p:sp>
+      <p:sp>
+        <p:nvSpPr>
+          <p:cNvPr id="6" name="TextBox 5">
+            <a:extLst>
+              <a:ext uri="{FF2B5EF4-FFF2-40B4-BE49-F238E27FC236}">
+                <a16:creationId xmlns:a16="http://schemas.microsoft.com/office/drawing/2014/main" id="{6BBECBED-BDAA-55C2-4167-80ED101A974D}"/>
+              </a:ext>
+            </a:extLst>
+          </p:cNvPr>
+          <p:cNvSpPr txBox="1"/>
+          <p:nvPr/>
+        </p:nvSpPr>
+        <p:spPr>
+          <a:xfrm>
+            <a:off x="549537" y="4740031"/>
+            <a:ext cx="11091600" cy="707886"/>
+          </a:xfrm>
+          <a:prstGeom prst="rect">
+            <a:avLst/>
+          </a:prstGeom>
+          <a:noFill/>
+        </p:spPr>
+        <p:txBody>
+          <a:bodyPr wrap="square" rtlCol="0">
+            <a:spAutoFit/>
+          </a:bodyPr>
+          <a:lstStyle/>
+          <a:p>
+            <a:r>
+              <a:rPr lang="it-IT" sz="4000" dirty="0">
+                <a:latin typeface="+mj-lt"/>
+              </a:rPr>
+              <a:t>Grazie per l’attenzione.</a:t>
+            </a:r>
+          </a:p>
+        </p:txBody>
+      </p:sp>
+    </p:spTree>
+    <p:extLst>
+      <p:ext uri="{BB962C8B-B14F-4D97-AF65-F5344CB8AC3E}">
+        <p14:creationId xmlns:p14="http://schemas.microsoft.com/office/powerpoint/2010/main" val="3911531236"/>
       </p:ext>
     </p:extLst>
   </p:cSld>

</xml_diff>